<commit_message>
first draft of present done
</commit_message>
<xml_diff>
--- a/presentations/sdr_partners_present.pptx
+++ b/presentations/sdr_partners_present.pptx
@@ -11,6 +11,15 @@
     <p:sldId id="259" r:id="rId5"/>
     <p:sldId id="260" r:id="rId6"/>
     <p:sldId id="261" r:id="rId7"/>
+    <p:sldId id="262" r:id="rId8"/>
+    <p:sldId id="263" r:id="rId9"/>
+    <p:sldId id="264" r:id="rId10"/>
+    <p:sldId id="265" r:id="rId11"/>
+    <p:sldId id="266" r:id="rId12"/>
+    <p:sldId id="267" r:id="rId13"/>
+    <p:sldId id="268" r:id="rId14"/>
+    <p:sldId id="269" r:id="rId15"/>
+    <p:sldId id="270" r:id="rId16"/>
   </p:sldIdLst>
   <p:sldSz cx="9144000" cy="6858000" type="screen4x3"/>
   <p:notesSz cx="6858000" cy="9144000"/>
@@ -3625,6 +3634,467 @@
 </p:sld>
 </file>
 
+<file path=ppt/slides/slide10.xml><?xml version="1.0" encoding="utf-8"?>
+<p:sld xmlns:a="http://schemas.openxmlformats.org/drawingml/2006/main" xmlns:r="http://schemas.openxmlformats.org/officeDocument/2006/relationships" xmlns:p="http://schemas.openxmlformats.org/presentationml/2006/main">
+  <p:cSld>
+    <p:spTree>
+      <p:nvGrpSpPr>
+        <p:cNvPr id="1" name=""/>
+        <p:cNvGrpSpPr/>
+        <p:nvPr/>
+      </p:nvGrpSpPr>
+      <p:grpSpPr>
+        <a:xfrm>
+          <a:off x="0" y="0"/>
+          <a:ext cx="0" cy="0"/>
+          <a:chOff x="0" y="0"/>
+          <a:chExt cx="0" cy="0"/>
+        </a:xfrm>
+      </p:grpSpPr>
+      <p:pic>
+        <p:nvPicPr>
+          <p:cNvPr descr="../pictures/flame_pics/flame_build_1.jpg" id="0" name="Picture 1"/>
+          <p:cNvPicPr>
+            <a:picLocks noGrp="1" noChangeAspect="1"/>
+          </p:cNvPicPr>
+          <p:nvPr/>
+        </p:nvPicPr>
+        <p:blipFill>
+          <a:blip r:embed="rId2"/>
+          <a:stretch>
+            <a:fillRect/>
+          </a:stretch>
+        </p:blipFill>
+        <p:spPr bwMode="auto">
+          <a:xfrm>
+            <a:off x="2616200" y="1117600"/>
+            <a:ext cx="3911600" cy="5219700"/>
+          </a:xfrm>
+          <a:prstGeom prst="rect">
+            <a:avLst/>
+          </a:prstGeom>
+          <a:noFill/>
+          <a:ln w="9525">
+            <a:noFill/>
+            <a:headEnd/>
+            <a:tailEnd/>
+          </a:ln>
+        </p:spPr>
+      </p:pic>
+    </p:spTree>
+  </p:cSld>
+</p:sld>
+</file>
+
+<file path=ppt/slides/slide11.xml><?xml version="1.0" encoding="utf-8"?>
+<p:sld xmlns:a="http://schemas.openxmlformats.org/drawingml/2006/main" xmlns:r="http://schemas.openxmlformats.org/officeDocument/2006/relationships" xmlns:p="http://schemas.openxmlformats.org/presentationml/2006/main">
+  <p:cSld>
+    <p:spTree>
+      <p:nvGrpSpPr>
+        <p:cNvPr id="1" name=""/>
+        <p:cNvGrpSpPr/>
+        <p:nvPr/>
+      </p:nvGrpSpPr>
+      <p:grpSpPr>
+        <a:xfrm>
+          <a:off x="0" y="0"/>
+          <a:ext cx="0" cy="0"/>
+          <a:chOff x="0" y="0"/>
+          <a:chExt cx="0" cy="0"/>
+        </a:xfrm>
+      </p:grpSpPr>
+      <p:pic>
+        <p:nvPicPr>
+          <p:cNvPr descr="../pictures/flame_pics/uw_flame_mendota_example.png" id="0" name="Picture 1"/>
+          <p:cNvPicPr>
+            <a:picLocks noGrp="1" noChangeAspect="1"/>
+          </p:cNvPicPr>
+          <p:nvPr/>
+        </p:nvPicPr>
+        <p:blipFill>
+          <a:blip r:embed="rId2"/>
+          <a:stretch>
+            <a:fillRect/>
+          </a:stretch>
+        </p:blipFill>
+        <p:spPr bwMode="auto">
+          <a:xfrm>
+            <a:off x="1193800" y="1117600"/>
+            <a:ext cx="6743700" cy="5219700"/>
+          </a:xfrm>
+          <a:prstGeom prst="rect">
+            <a:avLst/>
+          </a:prstGeom>
+          <a:noFill/>
+          <a:ln w="9525">
+            <a:noFill/>
+            <a:headEnd/>
+            <a:tailEnd/>
+          </a:ln>
+        </p:spPr>
+      </p:pic>
+    </p:spTree>
+  </p:cSld>
+</p:sld>
+</file>
+
+<file path=ppt/slides/slide12.xml><?xml version="1.0" encoding="utf-8"?>
+<p:sld xmlns:a="http://schemas.openxmlformats.org/drawingml/2006/main" xmlns:r="http://schemas.openxmlformats.org/officeDocument/2006/relationships" xmlns:p="http://schemas.openxmlformats.org/presentationml/2006/main">
+  <p:cSld>
+    <p:spTree>
+      <p:nvGrpSpPr>
+        <p:cNvPr id="1" name=""/>
+        <p:cNvGrpSpPr/>
+        <p:nvPr/>
+      </p:nvGrpSpPr>
+      <p:grpSpPr>
+        <a:xfrm>
+          <a:off x="0" y="0"/>
+          <a:ext cx="0" cy="0"/>
+          <a:chOff x="0" y="0"/>
+          <a:chExt cx="0" cy="0"/>
+        </a:xfrm>
+      </p:grpSpPr>
+      <p:sp>
+        <p:nvSpPr>
+          <p:cNvPr id="2" name="Title 1"/>
+          <p:cNvSpPr>
+            <a:spLocks noGrp="1"/>
+          </p:cNvSpPr>
+          <p:nvPr>
+            <p:ph type="title"/>
+          </p:nvPr>
+        </p:nvSpPr>
+        <p:spPr>
+          <a:xfrm>
+            <a:off x="457200" y="107879"/>
+            <a:ext cx="8229600" cy="1016071"/>
+          </a:xfrm>
+          <a:prstGeom prst="rect">
+            <a:avLst/>
+          </a:prstGeom>
+        </p:spPr>
+        <p:txBody>
+          <a:bodyPr/>
+          <a:lstStyle/>
+          <a:p>
+            <a:pPr lvl="0" marL="0" indent="0">
+              <a:buNone/>
+            </a:pPr>
+            <a:r>
+              <a:rPr/>
+              <a:t>What:</a:t>
+            </a:r>
+            <a:r>
+              <a:rPr/>
+              <a:t> </a:t>
+            </a:r>
+            <a:r>
+              <a:rPr/>
+              <a:t>HABS</a:t>
+            </a:r>
+            <a:r>
+              <a:rPr/>
+              <a:t> </a:t>
+            </a:r>
+            <a:r>
+              <a:rPr/>
+              <a:t>over</a:t>
+            </a:r>
+            <a:r>
+              <a:rPr/>
+              <a:t> </a:t>
+            </a:r>
+            <a:r>
+              <a:rPr/>
+              <a:t>time</a:t>
+            </a:r>
+          </a:p>
+        </p:txBody>
+      </p:sp>
+      <p:sp>
+        <p:nvSpPr>
+          <p:cNvPr id="3" name="Content Placeholder 2"/>
+          <p:cNvSpPr>
+            <a:spLocks noGrp="1"/>
+          </p:cNvSpPr>
+          <p:nvPr>
+            <p:ph idx="1"/>
+          </p:nvPr>
+        </p:nvSpPr>
+        <p:spPr/>
+        <p:txBody>
+          <a:bodyPr/>
+          <a:lstStyle/>
+          <a:p>
+            <a:pPr lvl="1"/>
+            <a:r>
+              <a:rPr/>
+              <a:t>Buoys</a:t>
+            </a:r>
+          </a:p>
+          <a:p>
+            <a:pPr lvl="2"/>
+            <a:r>
+              <a:rPr/>
+              <a:t>Nexsens CB-150</a:t>
+            </a:r>
+          </a:p>
+          <a:p>
+            <a:pPr lvl="3"/>
+            <a:r>
+              <a:rPr/>
+              <a:t>Multiparameter sonde</a:t>
+            </a:r>
+          </a:p>
+          <a:p>
+            <a:pPr lvl="4"/>
+            <a:r>
+              <a:rPr/>
+              <a:t>Temperature, dissolved oxygen, pH, conductivity, tubirdity, FDOM, chlorophyll, phycocyanin</a:t>
+            </a:r>
+          </a:p>
+          <a:p>
+            <a:pPr lvl="3"/>
+            <a:r>
+              <a:rPr/>
+              <a:t>Optical nitrate sensor</a:t>
+            </a:r>
+          </a:p>
+          <a:p>
+            <a:pPr lvl="3"/>
+            <a:r>
+              <a:rPr/>
+              <a:t>Weather station</a:t>
+            </a:r>
+          </a:p>
+          <a:p>
+            <a:pPr lvl="2"/>
+            <a:r>
+              <a:rPr/>
+              <a:t>FieldKit Water with solar</a:t>
+            </a:r>
+          </a:p>
+          <a:p>
+            <a:pPr lvl="3"/>
+            <a:r>
+              <a:rPr/>
+              <a:t>Temperature, dissolved oxygen, pH, conductivity</a:t>
+            </a:r>
+          </a:p>
+          <a:p>
+            <a:pPr lvl="1"/>
+            <a:r>
+              <a:rPr/>
+              <a:t>Fixed location</a:t>
+            </a:r>
+          </a:p>
+          <a:p>
+            <a:pPr lvl="1"/>
+            <a:r>
+              <a:rPr/>
+              <a:t>Every 15 minutes</a:t>
+            </a:r>
+          </a:p>
+        </p:txBody>
+      </p:sp>
+    </p:spTree>
+  </p:cSld>
+</p:sld>
+</file>
+
+<file path=ppt/slides/slide13.xml><?xml version="1.0" encoding="utf-8"?>
+<p:sld xmlns:a="http://schemas.openxmlformats.org/drawingml/2006/main" xmlns:r="http://schemas.openxmlformats.org/officeDocument/2006/relationships" xmlns:p="http://schemas.openxmlformats.org/presentationml/2006/main">
+  <p:cSld>
+    <p:spTree>
+      <p:nvGrpSpPr>
+        <p:cNvPr id="1" name=""/>
+        <p:cNvGrpSpPr/>
+        <p:nvPr/>
+      </p:nvGrpSpPr>
+      <p:grpSpPr>
+        <a:xfrm>
+          <a:off x="0" y="0"/>
+          <a:ext cx="0" cy="0"/>
+          <a:chOff x="0" y="0"/>
+          <a:chExt cx="0" cy="0"/>
+        </a:xfrm>
+      </p:grpSpPr>
+      <p:pic>
+        <p:nvPicPr>
+          <p:cNvPr descr="../pictures/buoy_pics/happy_field_crew.jpg" id="0" name="Picture 1"/>
+          <p:cNvPicPr>
+            <a:picLocks noGrp="1" noChangeAspect="1"/>
+          </p:cNvPicPr>
+          <p:nvPr/>
+        </p:nvPicPr>
+        <p:blipFill>
+          <a:blip r:embed="rId2"/>
+          <a:stretch>
+            <a:fillRect/>
+          </a:stretch>
+        </p:blipFill>
+        <p:spPr bwMode="auto">
+          <a:xfrm>
+            <a:off x="1092200" y="1117600"/>
+            <a:ext cx="6959600" cy="5219700"/>
+          </a:xfrm>
+          <a:prstGeom prst="rect">
+            <a:avLst/>
+          </a:prstGeom>
+          <a:noFill/>
+          <a:ln w="9525">
+            <a:noFill/>
+            <a:headEnd/>
+            <a:tailEnd/>
+          </a:ln>
+        </p:spPr>
+      </p:pic>
+    </p:spTree>
+  </p:cSld>
+</p:sld>
+</file>
+
+<file path=ppt/slides/slide14.xml><?xml version="1.0" encoding="utf-8"?>
+<p:sld xmlns:a="http://schemas.openxmlformats.org/drawingml/2006/main" xmlns:r="http://schemas.openxmlformats.org/officeDocument/2006/relationships" xmlns:p="http://schemas.openxmlformats.org/presentationml/2006/main">
+  <p:cSld>
+    <p:spTree>
+      <p:nvGrpSpPr>
+        <p:cNvPr id="1" name=""/>
+        <p:cNvGrpSpPr/>
+        <p:nvPr/>
+      </p:nvGrpSpPr>
+      <p:grpSpPr>
+        <a:xfrm>
+          <a:off x="0" y="0"/>
+          <a:ext cx="0" cy="0"/>
+          <a:chOff x="0" y="0"/>
+          <a:chExt cx="0" cy="0"/>
+        </a:xfrm>
+      </p:grpSpPr>
+      <p:pic>
+        <p:nvPicPr>
+          <p:cNvPr descr="../pictures/buoy_pics/hamblin_buoy.jpg" id="0" name="Picture 1"/>
+          <p:cNvPicPr>
+            <a:picLocks noGrp="1" noChangeAspect="1"/>
+          </p:cNvPicPr>
+          <p:nvPr/>
+        </p:nvPicPr>
+        <p:blipFill>
+          <a:blip r:embed="rId2"/>
+          <a:stretch>
+            <a:fillRect/>
+          </a:stretch>
+        </p:blipFill>
+        <p:spPr bwMode="auto">
+          <a:xfrm>
+            <a:off x="2616200" y="1117600"/>
+            <a:ext cx="3911600" cy="5219700"/>
+          </a:xfrm>
+          <a:prstGeom prst="rect">
+            <a:avLst/>
+          </a:prstGeom>
+          <a:noFill/>
+          <a:ln w="9525">
+            <a:noFill/>
+            <a:headEnd/>
+            <a:tailEnd/>
+          </a:ln>
+        </p:spPr>
+      </p:pic>
+    </p:spTree>
+  </p:cSld>
+</p:sld>
+</file>
+
+<file path=ppt/slides/slide15.xml><?xml version="1.0" encoding="utf-8"?>
+<p:sld xmlns:a="http://schemas.openxmlformats.org/drawingml/2006/main" xmlns:r="http://schemas.openxmlformats.org/officeDocument/2006/relationships" xmlns:p="http://schemas.openxmlformats.org/presentationml/2006/main">
+  <p:cSld>
+    <p:spTree>
+      <p:nvGrpSpPr>
+        <p:cNvPr id="1" name=""/>
+        <p:cNvGrpSpPr/>
+        <p:nvPr/>
+      </p:nvGrpSpPr>
+      <p:grpSpPr>
+        <a:xfrm>
+          <a:off x="0" y="0"/>
+          <a:ext cx="0" cy="0"/>
+          <a:chOff x="0" y="0"/>
+          <a:chExt cx="0" cy="0"/>
+        </a:xfrm>
+      </p:grpSpPr>
+      <p:sp>
+        <p:nvSpPr>
+          <p:cNvPr id="2" name="Title 1"/>
+          <p:cNvSpPr>
+            <a:spLocks noGrp="1"/>
+          </p:cNvSpPr>
+          <p:nvPr>
+            <p:ph type="title"/>
+          </p:nvPr>
+        </p:nvSpPr>
+        <p:spPr>
+          <a:xfrm>
+            <a:off x="457200" y="107879"/>
+            <a:ext cx="8229600" cy="1016071"/>
+          </a:xfrm>
+          <a:prstGeom prst="rect">
+            <a:avLst/>
+          </a:prstGeom>
+        </p:spPr>
+        <p:txBody>
+          <a:bodyPr/>
+          <a:lstStyle/>
+          <a:p>
+            <a:pPr lvl="0" marL="0" indent="0">
+              <a:buNone/>
+            </a:pPr>
+            <a:r>
+              <a:rPr/>
+              <a:t>Preliminary</a:t>
+            </a:r>
+            <a:r>
+              <a:rPr/>
+              <a:t> </a:t>
+            </a:r>
+            <a:r>
+              <a:rPr/>
+              <a:t>Results</a:t>
+            </a:r>
+          </a:p>
+        </p:txBody>
+      </p:sp>
+      <p:sp>
+        <p:nvSpPr>
+          <p:cNvPr id="3" name="Content Placeholder 2"/>
+          <p:cNvSpPr>
+            <a:spLocks noGrp="1"/>
+          </p:cNvSpPr>
+          <p:nvPr>
+            <p:ph idx="1"/>
+          </p:nvPr>
+        </p:nvSpPr>
+        <p:spPr/>
+        <p:txBody>
+          <a:bodyPr/>
+          <a:lstStyle/>
+          <a:p>
+            <a:pPr lvl="1"/>
+            <a:r>
+              <a:rPr>
+                <a:hlinkClick r:id="rId2"/>
+              </a:rPr>
+              <a:t>Shhhh</a:t>
+            </a:r>
+          </a:p>
+        </p:txBody>
+      </p:sp>
+    </p:spTree>
+  </p:cSld>
+</p:sld>
+</file>
+
 <file path=ppt/slides/slide2.xml><?xml version="1.0" encoding="utf-8"?>
 <p:sld xmlns:a="http://schemas.openxmlformats.org/drawingml/2006/main" xmlns:r="http://schemas.openxmlformats.org/officeDocument/2006/relationships" xmlns:p="http://schemas.openxmlformats.org/presentationml/2006/main">
   <p:cSld>
@@ -3702,6 +4172,22 @@
             <a:r>
               <a:rPr/>
               <a:t>Shubael Pond and Hamblin Pond</a:t>
+            </a:r>
+          </a:p>
+          <a:p>
+            <a:pPr lvl="2"/>
+            <a:r>
+              <a:rPr/>
+              <a:t>Compliments SDR</a:t>
+            </a:r>
+          </a:p>
+          <a:p>
+            <a:pPr lvl="2"/>
+            <a:r>
+              <a:rPr>
+                <a:hlinkClick r:id="rId2"/>
+              </a:rPr>
+              <a:t>A-pod</a:t>
             </a:r>
           </a:p>
           <a:p>
@@ -3742,76 +4228,36 @@
           <a:chExt cx="0" cy="0"/>
         </a:xfrm>
       </p:grpSpPr>
-      <p:sp>
-        <p:nvSpPr>
-          <p:cNvPr id="2" name="Title 1"/>
-          <p:cNvSpPr>
-            <a:spLocks noGrp="1"/>
-          </p:cNvSpPr>
-          <p:nvPr>
-            <p:ph type="title"/>
-          </p:nvPr>
-        </p:nvSpPr>
-        <p:spPr>
+      <p:pic>
+        <p:nvPicPr>
+          <p:cNvPr descr="../figures/coarse_cape_map.jpg" id="0" name="Picture 1"/>
+          <p:cNvPicPr>
+            <a:picLocks noGrp="1" noChangeAspect="1"/>
+          </p:cNvPicPr>
+          <p:nvPr/>
+        </p:nvPicPr>
+        <p:blipFill>
+          <a:blip r:embed="rId2"/>
+          <a:stretch>
+            <a:fillRect/>
+          </a:stretch>
+        </p:blipFill>
+        <p:spPr bwMode="auto">
           <a:xfrm>
-            <a:off x="457200" y="107879"/>
-            <a:ext cx="8229600" cy="1016071"/>
+            <a:off x="1092200" y="1117600"/>
+            <a:ext cx="6959600" cy="5219700"/>
           </a:xfrm>
           <a:prstGeom prst="rect">
             <a:avLst/>
           </a:prstGeom>
+          <a:noFill/>
+          <a:ln w="9525">
+            <a:noFill/>
+            <a:headEnd/>
+            <a:tailEnd/>
+          </a:ln>
         </p:spPr>
-        <p:txBody>
-          <a:bodyPr/>
-          <a:lstStyle/>
-          <a:p>
-            <a:pPr lvl="0" marL="0" indent="0">
-              <a:buNone/>
-            </a:pPr>
-            <a:r>
-              <a:rPr/>
-              <a:t>Why</a:t>
-            </a:r>
-          </a:p>
-        </p:txBody>
-      </p:sp>
-      <p:sp>
-        <p:nvSpPr>
-          <p:cNvPr id="3" name="Content Placeholder 2"/>
-          <p:cNvSpPr>
-            <a:spLocks noGrp="1"/>
-          </p:cNvSpPr>
-          <p:nvPr>
-            <p:ph idx="1"/>
-          </p:nvPr>
-        </p:nvSpPr>
-        <p:spPr/>
-        <p:txBody>
-          <a:bodyPr/>
-          <a:lstStyle/>
-          <a:p>
-            <a:pPr lvl="1"/>
-            <a:r>
-              <a:rPr/>
-              <a:t>Why High Resolution?</a:t>
-            </a:r>
-          </a:p>
-          <a:p>
-            <a:pPr lvl="1"/>
-            <a:r>
-              <a:rPr/>
-              <a:t>Why in Shubael?</a:t>
-            </a:r>
-          </a:p>
-          <a:p>
-            <a:pPr lvl="1"/>
-            <a:r>
-              <a:rPr/>
-              <a:t>Why in Hamblin?</a:t>
-            </a:r>
-          </a:p>
-        </p:txBody>
-      </p:sp>
+      </p:pic>
     </p:spTree>
   </p:cSld>
 </p:sld>
@@ -3834,149 +4280,36 @@
           <a:chExt cx="0" cy="0"/>
         </a:xfrm>
       </p:grpSpPr>
-      <p:sp>
-        <p:nvSpPr>
-          <p:cNvPr id="2" name="Title 1"/>
-          <p:cNvSpPr>
-            <a:spLocks noGrp="1"/>
-          </p:cNvSpPr>
-          <p:nvPr>
-            <p:ph type="title"/>
-          </p:nvPr>
-        </p:nvSpPr>
-        <p:spPr>
+      <p:pic>
+        <p:nvPicPr>
+          <p:cNvPr descr="../figures/cape_pond_map.jpg" id="0" name="Picture 1"/>
+          <p:cNvPicPr>
+            <a:picLocks noGrp="1" noChangeAspect="1"/>
+          </p:cNvPicPr>
+          <p:nvPr/>
+        </p:nvPicPr>
+        <p:blipFill>
+          <a:blip r:embed="rId2"/>
+          <a:stretch>
+            <a:fillRect/>
+          </a:stretch>
+        </p:blipFill>
+        <p:spPr bwMode="auto">
           <a:xfrm>
-            <a:off x="457200" y="107879"/>
-            <a:ext cx="8229600" cy="1016071"/>
+            <a:off x="1092200" y="1117600"/>
+            <a:ext cx="6959600" cy="5219700"/>
           </a:xfrm>
           <a:prstGeom prst="rect">
             <a:avLst/>
           </a:prstGeom>
+          <a:noFill/>
+          <a:ln w="9525">
+            <a:noFill/>
+            <a:headEnd/>
+            <a:tailEnd/>
+          </a:ln>
         </p:spPr>
-        <p:txBody>
-          <a:bodyPr/>
-          <a:lstStyle/>
-          <a:p>
-            <a:pPr lvl="0" marL="0" indent="0">
-              <a:buNone/>
-            </a:pPr>
-            <a:r>
-              <a:rPr/>
-              <a:t>What:</a:t>
-            </a:r>
-            <a:r>
-              <a:rPr/>
-              <a:t> </a:t>
-            </a:r>
-            <a:r>
-              <a:rPr/>
-              <a:t>HABS</a:t>
-            </a:r>
-            <a:r>
-              <a:rPr/>
-              <a:t> </a:t>
-            </a:r>
-            <a:r>
-              <a:rPr/>
-              <a:t>over</a:t>
-            </a:r>
-            <a:r>
-              <a:rPr/>
-              <a:t> </a:t>
-            </a:r>
-            <a:r>
-              <a:rPr/>
-              <a:t>time</a:t>
-            </a:r>
-          </a:p>
-        </p:txBody>
-      </p:sp>
-      <p:sp>
-        <p:nvSpPr>
-          <p:cNvPr id="3" name="Content Placeholder 2"/>
-          <p:cNvSpPr>
-            <a:spLocks noGrp="1"/>
-          </p:cNvSpPr>
-          <p:nvPr>
-            <p:ph idx="1"/>
-          </p:nvPr>
-        </p:nvSpPr>
-        <p:spPr/>
-        <p:txBody>
-          <a:bodyPr/>
-          <a:lstStyle/>
-          <a:p>
-            <a:pPr lvl="1"/>
-            <a:r>
-              <a:rPr/>
-              <a:t>Buoys</a:t>
-            </a:r>
-          </a:p>
-          <a:p>
-            <a:pPr lvl="2"/>
-            <a:r>
-              <a:rPr/>
-              <a:t>Nexsens CB-150</a:t>
-            </a:r>
-          </a:p>
-          <a:p>
-            <a:pPr lvl="3"/>
-            <a:r>
-              <a:rPr/>
-              <a:t>Multiparameter sonde</a:t>
-            </a:r>
-          </a:p>
-          <a:p>
-            <a:pPr lvl="4"/>
-            <a:r>
-              <a:rPr/>
-              <a:t>Temperature, dissolved oxygen, pH, conductivity, tubirdity, FDOM, chlorophyll, phycocyanin</a:t>
-            </a:r>
-          </a:p>
-          <a:p>
-            <a:pPr lvl="3"/>
-            <a:r>
-              <a:rPr/>
-              <a:t>Optical nitrate sensor</a:t>
-            </a:r>
-          </a:p>
-          <a:p>
-            <a:pPr lvl="3"/>
-            <a:r>
-              <a:rPr/>
-              <a:t>Weather station</a:t>
-            </a:r>
-          </a:p>
-          <a:p>
-            <a:pPr lvl="2"/>
-            <a:r>
-              <a:rPr/>
-              <a:t>FieldKit Water with solar</a:t>
-            </a:r>
-          </a:p>
-          <a:p>
-            <a:pPr lvl="3"/>
-            <a:r>
-              <a:rPr/>
-              <a:t>Temperature, dissolved oxygen, pH, conductivity</a:t>
-            </a:r>
-          </a:p>
-          <a:p>
-            <a:pPr lvl="1"/>
-            <a:r>
-              <a:rPr/>
-              <a:t>Fixed location</a:t>
-            </a:r>
-          </a:p>
-          <a:p>
-            <a:pPr lvl="1"/>
-            <a:r>
-              <a:rPr/>
-              <a:t>Every 15 minutes</a:t>
-            </a:r>
-          </a:p>
-        </p:txBody>
-      </p:sp>
+      </p:pic>
     </p:spTree>
   </p:cSld>
 </p:sld>
@@ -4027,7 +4360,7 @@
             </a:pPr>
             <a:r>
               <a:rPr/>
-              <a:t>What:</a:t>
+              <a:t>Why</a:t>
             </a:r>
             <a:r>
               <a:rPr/>
@@ -4035,7 +4368,7 @@
             </a:r>
             <a:r>
               <a:rPr/>
-              <a:t>HABS</a:t>
+              <a:t>High</a:t>
             </a:r>
             <a:r>
               <a:rPr/>
@@ -4043,15 +4376,7 @@
             </a:r>
             <a:r>
               <a:rPr/>
-              <a:t>over</a:t>
-            </a:r>
-            <a:r>
-              <a:rPr/>
-              <a:t> </a:t>
-            </a:r>
-            <a:r>
-              <a:rPr/>
-              <a:t>space</a:t>
+              <a:t>Resolution?</a:t>
             </a:r>
           </a:p>
         </p:txBody>
@@ -4074,62 +4399,21 @@
             <a:pPr lvl="1"/>
             <a:r>
               <a:rPr/>
-              <a:t>Fast Limnological Automated Measurments (FLAMe)</a:t>
+              <a:t>Why High Resolution?</a:t>
             </a:r>
           </a:p>
           <a:p>
             <a:pPr lvl="2"/>
             <a:r>
               <a:rPr/>
-              <a:t>University of Wisconsin Center for Limnology: </a:t>
-            </a:r>
-            <a:r>
-              <a:rPr>
-                <a:hlinkClick r:id="rId2"/>
-              </a:rPr>
-              <a:t>https://flame.wisc.edu</a:t>
+              <a:t>We know the general process</a:t>
             </a:r>
           </a:p>
           <a:p>
             <a:pPr lvl="2"/>
             <a:r>
               <a:rPr/>
-              <a:t>On-board flow through system</a:t>
-            </a:r>
-          </a:p>
-          <a:p>
-            <a:pPr lvl="2"/>
-            <a:r>
-              <a:rPr/>
-              <a:t>Multiparameter Sonde</a:t>
-            </a:r>
-          </a:p>
-          <a:p>
-            <a:pPr lvl="2"/>
-            <a:r>
-              <a:rPr/>
-              <a:t>Optical nitrate sensor</a:t>
-            </a:r>
-          </a:p>
-          <a:p>
-            <a:pPr lvl="2"/>
-            <a:r>
-              <a:rPr/>
-              <a:t>Measurements approx. every 20 meters</a:t>
-            </a:r>
-          </a:p>
-          <a:p>
-            <a:pPr lvl="2"/>
-            <a:r>
-              <a:rPr/>
-              <a:t>Twice a month</a:t>
-            </a:r>
-          </a:p>
-          <a:p>
-            <a:pPr lvl="2"/>
-            <a:r>
-              <a:rPr/>
-              <a:t>Work in progress!</a:t>
+              <a:t>Don’t know fine scale triggers</a:t>
             </a:r>
           </a:p>
         </p:txBody>
@@ -4156,6 +4440,58 @@
           <a:chExt cx="0" cy="0"/>
         </a:xfrm>
       </p:grpSpPr>
+      <p:pic>
+        <p:nvPicPr>
+          <p:cNvPr descr="sdr_partners_present_files/figure-pptx/unnamed-chunk-2-1.png" id="0" name="Picture 1"/>
+          <p:cNvPicPr>
+            <a:picLocks noGrp="1" noChangeAspect="1"/>
+          </p:cNvPicPr>
+          <p:nvPr/>
+        </p:nvPicPr>
+        <p:blipFill>
+          <a:blip r:embed="rId2"/>
+          <a:stretch>
+            <a:fillRect/>
+          </a:stretch>
+        </p:blipFill>
+        <p:spPr bwMode="auto">
+          <a:xfrm>
+            <a:off x="457200" y="1676400"/>
+            <a:ext cx="8229600" cy="4114800"/>
+          </a:xfrm>
+          <a:prstGeom prst="rect">
+            <a:avLst/>
+          </a:prstGeom>
+          <a:noFill/>
+          <a:ln w="9525">
+            <a:noFill/>
+            <a:headEnd/>
+            <a:tailEnd/>
+          </a:ln>
+        </p:spPr>
+      </p:pic>
+    </p:spTree>
+  </p:cSld>
+</p:sld>
+</file>
+
+<file path=ppt/slides/slide7.xml><?xml version="1.0" encoding="utf-8"?>
+<p:sld xmlns:a="http://schemas.openxmlformats.org/drawingml/2006/main" xmlns:r="http://schemas.openxmlformats.org/officeDocument/2006/relationships" xmlns:p="http://schemas.openxmlformats.org/presentationml/2006/main">
+  <p:cSld>
+    <p:spTree>
+      <p:nvGrpSpPr>
+        <p:cNvPr id="1" name=""/>
+        <p:cNvGrpSpPr/>
+        <p:nvPr/>
+      </p:nvGrpSpPr>
+      <p:grpSpPr>
+        <a:xfrm>
+          <a:off x="0" y="0"/>
+          <a:ext cx="0" cy="0"/>
+          <a:chOff x="0" y="0"/>
+          <a:chExt cx="0" cy="0"/>
+        </a:xfrm>
+      </p:grpSpPr>
       <p:sp>
         <p:nvSpPr>
           <p:cNvPr id="2" name="Title 1"/>
@@ -4184,7 +4520,7 @@
             </a:pPr>
             <a:r>
               <a:rPr/>
-              <a:t>Preliminary</a:t>
+              <a:t>Why</a:t>
             </a:r>
             <a:r>
               <a:rPr/>
@@ -4192,7 +4528,15 @@
             </a:r>
             <a:r>
               <a:rPr/>
-              <a:t>Results</a:t>
+              <a:t>High</a:t>
+            </a:r>
+            <a:r>
+              <a:rPr/>
+              <a:t> </a:t>
+            </a:r>
+            <a:r>
+              <a:rPr/>
+              <a:t>Resolution?</a:t>
             </a:r>
           </a:p>
         </p:txBody>
@@ -4213,11 +4557,239 @@
           <a:lstStyle/>
           <a:p>
             <a:pPr lvl="1"/>
+            <a:r>
+              <a:rPr/>
+              <a:t>Why High Resolution?</a:t>
+            </a:r>
+          </a:p>
+          <a:p>
+            <a:pPr lvl="2"/>
+            <a:r>
+              <a:rPr/>
+              <a:t>We know the general process</a:t>
+            </a:r>
+          </a:p>
+          <a:p>
+            <a:pPr lvl="2"/>
+            <a:r>
+              <a:rPr/>
+              <a:t>Don’t know fine scale triggers</a:t>
+            </a:r>
+          </a:p>
+          <a:p>
+            <a:pPr lvl="2"/>
+            <a:r>
+              <a:rPr/>
+              <a:t>Forecasting requires high resolution (e.g. )</a:t>
+            </a:r>
+          </a:p>
+        </p:txBody>
+      </p:sp>
+    </p:spTree>
+  </p:cSld>
+</p:sld>
+</file>
+
+<file path=ppt/slides/slide8.xml><?xml version="1.0" encoding="utf-8"?>
+<p:sld xmlns:a="http://schemas.openxmlformats.org/drawingml/2006/main" xmlns:r="http://schemas.openxmlformats.org/officeDocument/2006/relationships" xmlns:p="http://schemas.openxmlformats.org/presentationml/2006/main">
+  <p:cSld>
+    <p:spTree>
+      <p:nvGrpSpPr>
+        <p:cNvPr id="1" name=""/>
+        <p:cNvGrpSpPr/>
+        <p:nvPr/>
+      </p:nvGrpSpPr>
+      <p:grpSpPr>
+        <a:xfrm>
+          <a:off x="0" y="0"/>
+          <a:ext cx="0" cy="0"/>
+          <a:chOff x="0" y="0"/>
+          <a:chExt cx="0" cy="0"/>
+        </a:xfrm>
+      </p:grpSpPr>
+      <p:pic>
+        <p:nvPicPr>
+          <p:cNvPr descr="../figures/rhody_ponds_timescale.jpg" id="0" name="Picture 1"/>
+          <p:cNvPicPr>
+            <a:picLocks noGrp="1" noChangeAspect="1"/>
+          </p:cNvPicPr>
+          <p:nvPr/>
+        </p:nvPicPr>
+        <p:blipFill>
+          <a:blip r:embed="rId2"/>
+          <a:stretch>
+            <a:fillRect/>
+          </a:stretch>
+        </p:blipFill>
+        <p:spPr bwMode="auto">
+          <a:xfrm>
+            <a:off x="457200" y="1257300"/>
+            <a:ext cx="8229600" cy="4927600"/>
+          </a:xfrm>
+          <a:prstGeom prst="rect">
+            <a:avLst/>
+          </a:prstGeom>
+          <a:noFill/>
+          <a:ln w="9525">
+            <a:noFill/>
+            <a:headEnd/>
+            <a:tailEnd/>
+          </a:ln>
+        </p:spPr>
+      </p:pic>
+    </p:spTree>
+  </p:cSld>
+</p:sld>
+</file>
+
+<file path=ppt/slides/slide9.xml><?xml version="1.0" encoding="utf-8"?>
+<p:sld xmlns:a="http://schemas.openxmlformats.org/drawingml/2006/main" xmlns:r="http://schemas.openxmlformats.org/officeDocument/2006/relationships" xmlns:p="http://schemas.openxmlformats.org/presentationml/2006/main">
+  <p:cSld>
+    <p:spTree>
+      <p:nvGrpSpPr>
+        <p:cNvPr id="1" name=""/>
+        <p:cNvGrpSpPr/>
+        <p:nvPr/>
+      </p:nvGrpSpPr>
+      <p:grpSpPr>
+        <a:xfrm>
+          <a:off x="0" y="0"/>
+          <a:ext cx="0" cy="0"/>
+          <a:chOff x="0" y="0"/>
+          <a:chExt cx="0" cy="0"/>
+        </a:xfrm>
+      </p:grpSpPr>
+      <p:sp>
+        <p:nvSpPr>
+          <p:cNvPr id="2" name="Title 1"/>
+          <p:cNvSpPr>
+            <a:spLocks noGrp="1"/>
+          </p:cNvSpPr>
+          <p:nvPr>
+            <p:ph type="title"/>
+          </p:nvPr>
+        </p:nvSpPr>
+        <p:spPr>
+          <a:xfrm>
+            <a:off x="457200" y="107879"/>
+            <a:ext cx="8229600" cy="1016071"/>
+          </a:xfrm>
+          <a:prstGeom prst="rect">
+            <a:avLst/>
+          </a:prstGeom>
+        </p:spPr>
+        <p:txBody>
+          <a:bodyPr/>
+          <a:lstStyle/>
+          <a:p>
+            <a:pPr lvl="0" marL="0" indent="0">
+              <a:buNone/>
+            </a:pPr>
+            <a:r>
+              <a:rPr/>
+              <a:t>What:</a:t>
+            </a:r>
+            <a:r>
+              <a:rPr/>
+              <a:t> </a:t>
+            </a:r>
+            <a:r>
+              <a:rPr/>
+              <a:t>HABS</a:t>
+            </a:r>
+            <a:r>
+              <a:rPr/>
+              <a:t> </a:t>
+            </a:r>
+            <a:r>
+              <a:rPr/>
+              <a:t>over</a:t>
+            </a:r>
+            <a:r>
+              <a:rPr/>
+              <a:t> </a:t>
+            </a:r>
+            <a:r>
+              <a:rPr/>
+              <a:t>space</a:t>
+            </a:r>
+          </a:p>
+        </p:txBody>
+      </p:sp>
+      <p:sp>
+        <p:nvSpPr>
+          <p:cNvPr id="3" name="Content Placeholder 2"/>
+          <p:cNvSpPr>
+            <a:spLocks noGrp="1"/>
+          </p:cNvSpPr>
+          <p:nvPr>
+            <p:ph idx="1"/>
+          </p:nvPr>
+        </p:nvSpPr>
+        <p:spPr/>
+        <p:txBody>
+          <a:bodyPr/>
+          <a:lstStyle/>
+          <a:p>
+            <a:pPr lvl="1"/>
+            <a:r>
+              <a:rPr/>
+              <a:t>Fast Limnological Automated Measurments (FLAMe)</a:t>
+            </a:r>
+          </a:p>
+          <a:p>
+            <a:pPr lvl="2"/>
+            <a:r>
+              <a:rPr/>
+              <a:t>University of Wisconsin Center for Limnology: </a:t>
+            </a:r>
             <a:r>
               <a:rPr>
                 <a:hlinkClick r:id="rId2"/>
               </a:rPr>
-              <a:t>Shhhh</a:t>
+              <a:t>https://flame.wisc.edu</a:t>
+            </a:r>
+          </a:p>
+          <a:p>
+            <a:pPr lvl="2"/>
+            <a:r>
+              <a:rPr/>
+              <a:t>On-board flow through system</a:t>
+            </a:r>
+          </a:p>
+          <a:p>
+            <a:pPr lvl="2"/>
+            <a:r>
+              <a:rPr/>
+              <a:t>Multiparameter Sonde</a:t>
+            </a:r>
+          </a:p>
+          <a:p>
+            <a:pPr lvl="2"/>
+            <a:r>
+              <a:rPr/>
+              <a:t>Optical nitrate sensor</a:t>
+            </a:r>
+          </a:p>
+          <a:p>
+            <a:pPr lvl="2"/>
+            <a:r>
+              <a:rPr/>
+              <a:t>Measurements approx. every 20 meters</a:t>
+            </a:r>
+          </a:p>
+          <a:p>
+            <a:pPr lvl="2"/>
+            <a:r>
+              <a:rPr/>
+              <a:t>Twice a month</a:t>
+            </a:r>
+          </a:p>
+          <a:p>
+            <a:pPr lvl="2"/>
+            <a:r>
+              <a:rPr/>
+              <a:t>Work in progress!</a:t>
             </a:r>
           </a:p>
         </p:txBody>

</xml_diff>